<commit_message>
correlation matrices, sbs analysis
</commit_message>
<xml_diff>
--- a/Figures/Conceptual.pptx
+++ b/Figures/Conceptual.pptx
@@ -5,7 +5,7 @@
     <p:sldMasterId id="2147483648" r:id="rId1"/>
   </p:sldMasterIdLst>
   <p:notesMasterIdLst>
-    <p:notesMasterId r:id="rId16"/>
+    <p:notesMasterId r:id="rId17"/>
   </p:notesMasterIdLst>
   <p:sldIdLst>
     <p:sldId id="265" r:id="rId2"/>
@@ -22,6 +22,7 @@
     <p:sldId id="267" r:id="rId13"/>
     <p:sldId id="268" r:id="rId14"/>
     <p:sldId id="269" r:id="rId15"/>
+    <p:sldId id="270" r:id="rId16"/>
   </p:sldIdLst>
   <p:sldSz cx="12192000" cy="6858000"/>
   <p:notesSz cx="6858000" cy="9144000"/>
@@ -210,7 +211,7 @@
           <a:p>
             <a:fld id="{5E3EEF82-4429-42F4-9DDC-A745DD20D115}" type="datetimeFigureOut">
               <a:rPr lang="en-US" smtClean="0"/>
-              <a:t>8/24/2022</a:t>
+              <a:t>12/6/2022</a:t>
             </a:fld>
             <a:endParaRPr lang="en-US"/>
           </a:p>
@@ -825,6 +826,162 @@
 </p:notes>
 </file>
 
+<file path=ppt/notesSlides/notesSlide5.xml><?xml version="1.0" encoding="utf-8"?>
+<p:notes xmlns:a="http://schemas.openxmlformats.org/drawingml/2006/main" xmlns:r="http://schemas.openxmlformats.org/officeDocument/2006/relationships" xmlns:p="http://schemas.openxmlformats.org/presentationml/2006/main">
+  <p:cSld>
+    <p:spTree>
+      <p:nvGrpSpPr>
+        <p:cNvPr id="1" name=""/>
+        <p:cNvGrpSpPr/>
+        <p:nvPr/>
+      </p:nvGrpSpPr>
+      <p:grpSpPr>
+        <a:xfrm>
+          <a:off x="0" y="0"/>
+          <a:ext cx="0" cy="0"/>
+          <a:chOff x="0" y="0"/>
+          <a:chExt cx="0" cy="0"/>
+        </a:xfrm>
+      </p:grpSpPr>
+      <p:sp>
+        <p:nvSpPr>
+          <p:cNvPr id="2" name="Slide Image Placeholder 1"/>
+          <p:cNvSpPr>
+            <a:spLocks noGrp="1" noRot="1" noChangeAspect="1"/>
+          </p:cNvSpPr>
+          <p:nvPr>
+            <p:ph type="sldImg"/>
+          </p:nvPr>
+        </p:nvSpPr>
+        <p:spPr/>
+      </p:sp>
+      <p:sp>
+        <p:nvSpPr>
+          <p:cNvPr id="3" name="Notes Placeholder 2"/>
+          <p:cNvSpPr>
+            <a:spLocks noGrp="1"/>
+          </p:cNvSpPr>
+          <p:nvPr>
+            <p:ph type="body" idx="1"/>
+          </p:nvPr>
+        </p:nvSpPr>
+        <p:spPr/>
+        <p:txBody>
+          <a:bodyPr/>
+          <a:lstStyle/>
+          <a:p>
+            <a:r>
+              <a:rPr lang="en-US" dirty="0"/>
+              <a:t>Local drivers, landscape drivers, regional/macroscale drivers (which are basically all the same in our study)</a:t>
+            </a:r>
+          </a:p>
+          <a:p>
+            <a:endParaRPr lang="en-US" dirty="0"/>
+          </a:p>
+          <a:p>
+            <a:r>
+              <a:rPr lang="en-US" dirty="0"/>
+              <a:t>Background drivers</a:t>
+            </a:r>
+          </a:p>
+          <a:p>
+            <a:endParaRPr lang="en-US" dirty="0"/>
+          </a:p>
+          <a:p>
+            <a:r>
+              <a:rPr lang="en-US" dirty="0"/>
+              <a:t>Local: lake morphometry, water chemistry, food web dynamics, sediment properties</a:t>
+            </a:r>
+          </a:p>
+          <a:p>
+            <a:endParaRPr lang="en-US" dirty="0"/>
+          </a:p>
+          <a:p>
+            <a:r>
+              <a:rPr lang="en-US" dirty="0"/>
+              <a:t>Landscape: watershed morphometry, hydrology, LULC, soils, topography</a:t>
+            </a:r>
+          </a:p>
+          <a:p>
+            <a:endParaRPr lang="en-US" dirty="0"/>
+          </a:p>
+          <a:p>
+            <a:r>
+              <a:rPr lang="en-US" dirty="0"/>
+              <a:t>Regional/macroscale: climate, hydrology</a:t>
+            </a:r>
+          </a:p>
+          <a:p>
+            <a:endParaRPr lang="en-US" dirty="0"/>
+          </a:p>
+          <a:p>
+            <a:endParaRPr lang="en-US" dirty="0"/>
+          </a:p>
+          <a:p>
+            <a:r>
+              <a:rPr lang="en-US" dirty="0"/>
+              <a:t>Low threshold: clear/unproductive, shallow, connected lake with high watershed/lake area ratio</a:t>
+            </a:r>
+          </a:p>
+          <a:p>
+            <a:endParaRPr lang="en-US" dirty="0"/>
+          </a:p>
+          <a:p>
+            <a:r>
+              <a:rPr lang="en-US" dirty="0"/>
+              <a:t>High threshold: green/productive, deep, isolated with low watershed/lake area ratio</a:t>
+            </a:r>
+          </a:p>
+          <a:p>
+            <a:endParaRPr lang="en-US" dirty="0"/>
+          </a:p>
+          <a:p>
+            <a:r>
+              <a:rPr lang="en-US" dirty="0"/>
+              <a:t>Brown lakes: post-fire nutrient inputs cannot override light limitation</a:t>
+            </a:r>
+          </a:p>
+          <a:p>
+            <a:endParaRPr lang="en-US" dirty="0"/>
+          </a:p>
+        </p:txBody>
+      </p:sp>
+      <p:sp>
+        <p:nvSpPr>
+          <p:cNvPr id="4" name="Slide Number Placeholder 3"/>
+          <p:cNvSpPr>
+            <a:spLocks noGrp="1"/>
+          </p:cNvSpPr>
+          <p:nvPr>
+            <p:ph type="sldNum" sz="quarter" idx="5"/>
+          </p:nvPr>
+        </p:nvSpPr>
+        <p:spPr/>
+        <p:txBody>
+          <a:bodyPr/>
+          <a:lstStyle/>
+          <a:p>
+            <a:fld id="{DEDA2B27-EC8D-401D-82FE-657F8A5648FD}" type="slidenum">
+              <a:rPr lang="en-US" smtClean="0"/>
+              <a:t>15</a:t>
+            </a:fld>
+            <a:endParaRPr lang="en-US"/>
+          </a:p>
+        </p:txBody>
+      </p:sp>
+    </p:spTree>
+    <p:extLst>
+      <p:ext uri="{BB962C8B-B14F-4D97-AF65-F5344CB8AC3E}">
+        <p14:creationId xmlns:p14="http://schemas.microsoft.com/office/powerpoint/2010/main" val="509262219"/>
+      </p:ext>
+    </p:extLst>
+  </p:cSld>
+  <p:clrMapOvr>
+    <a:masterClrMapping/>
+  </p:clrMapOvr>
+</p:notes>
+</file>
+
 <file path=ppt/slideLayouts/slideLayout1.xml><?xml version="1.0" encoding="utf-8"?>
 <p:sldLayout xmlns:a="http://schemas.openxmlformats.org/drawingml/2006/main" xmlns:r="http://schemas.openxmlformats.org/officeDocument/2006/relationships" xmlns:p="http://schemas.openxmlformats.org/presentationml/2006/main" type="title" preserve="1">
   <p:cSld name="Title Slide">
@@ -972,7 +1129,7 @@
           <a:p>
             <a:fld id="{4C3BA45E-F6BF-4EAD-A0E0-58CFAB394E76}" type="datetimeFigureOut">
               <a:rPr lang="en-US" smtClean="0"/>
-              <a:t>8/24/2022</a:t>
+              <a:t>12/6/2022</a:t>
             </a:fld>
             <a:endParaRPr lang="en-US"/>
           </a:p>
@@ -1170,7 +1327,7 @@
           <a:p>
             <a:fld id="{4C3BA45E-F6BF-4EAD-A0E0-58CFAB394E76}" type="datetimeFigureOut">
               <a:rPr lang="en-US" smtClean="0"/>
-              <a:t>8/24/2022</a:t>
+              <a:t>12/6/2022</a:t>
             </a:fld>
             <a:endParaRPr lang="en-US"/>
           </a:p>
@@ -1378,7 +1535,7 @@
           <a:p>
             <a:fld id="{4C3BA45E-F6BF-4EAD-A0E0-58CFAB394E76}" type="datetimeFigureOut">
               <a:rPr lang="en-US" smtClean="0"/>
-              <a:t>8/24/2022</a:t>
+              <a:t>12/6/2022</a:t>
             </a:fld>
             <a:endParaRPr lang="en-US"/>
           </a:p>
@@ -1576,7 +1733,7 @@
           <a:p>
             <a:fld id="{4C3BA45E-F6BF-4EAD-A0E0-58CFAB394E76}" type="datetimeFigureOut">
               <a:rPr lang="en-US" smtClean="0"/>
-              <a:t>8/24/2022</a:t>
+              <a:t>12/6/2022</a:t>
             </a:fld>
             <a:endParaRPr lang="en-US"/>
           </a:p>
@@ -1851,7 +2008,7 @@
           <a:p>
             <a:fld id="{4C3BA45E-F6BF-4EAD-A0E0-58CFAB394E76}" type="datetimeFigureOut">
               <a:rPr lang="en-US" smtClean="0"/>
-              <a:t>8/24/2022</a:t>
+              <a:t>12/6/2022</a:t>
             </a:fld>
             <a:endParaRPr lang="en-US"/>
           </a:p>
@@ -2116,7 +2273,7 @@
           <a:p>
             <a:fld id="{4C3BA45E-F6BF-4EAD-A0E0-58CFAB394E76}" type="datetimeFigureOut">
               <a:rPr lang="en-US" smtClean="0"/>
-              <a:t>8/24/2022</a:t>
+              <a:t>12/6/2022</a:t>
             </a:fld>
             <a:endParaRPr lang="en-US"/>
           </a:p>
@@ -2528,7 +2685,7 @@
           <a:p>
             <a:fld id="{4C3BA45E-F6BF-4EAD-A0E0-58CFAB394E76}" type="datetimeFigureOut">
               <a:rPr lang="en-US" smtClean="0"/>
-              <a:t>8/24/2022</a:t>
+              <a:t>12/6/2022</a:t>
             </a:fld>
             <a:endParaRPr lang="en-US"/>
           </a:p>
@@ -2669,7 +2826,7 @@
           <a:p>
             <a:fld id="{4C3BA45E-F6BF-4EAD-A0E0-58CFAB394E76}" type="datetimeFigureOut">
               <a:rPr lang="en-US" smtClean="0"/>
-              <a:t>8/24/2022</a:t>
+              <a:t>12/6/2022</a:t>
             </a:fld>
             <a:endParaRPr lang="en-US"/>
           </a:p>
@@ -2782,7 +2939,7 @@
           <a:p>
             <a:fld id="{4C3BA45E-F6BF-4EAD-A0E0-58CFAB394E76}" type="datetimeFigureOut">
               <a:rPr lang="en-US" smtClean="0"/>
-              <a:t>8/24/2022</a:t>
+              <a:t>12/6/2022</a:t>
             </a:fld>
             <a:endParaRPr lang="en-US"/>
           </a:p>
@@ -3093,7 +3250,7 @@
           <a:p>
             <a:fld id="{4C3BA45E-F6BF-4EAD-A0E0-58CFAB394E76}" type="datetimeFigureOut">
               <a:rPr lang="en-US" smtClean="0"/>
-              <a:t>8/24/2022</a:t>
+              <a:t>12/6/2022</a:t>
             </a:fld>
             <a:endParaRPr lang="en-US"/>
           </a:p>
@@ -3381,7 +3538,7 @@
           <a:p>
             <a:fld id="{4C3BA45E-F6BF-4EAD-A0E0-58CFAB394E76}" type="datetimeFigureOut">
               <a:rPr lang="en-US" smtClean="0"/>
-              <a:t>8/24/2022</a:t>
+              <a:t>12/6/2022</a:t>
             </a:fld>
             <a:endParaRPr lang="en-US"/>
           </a:p>
@@ -3622,7 +3779,7 @@
           <a:p>
             <a:fld id="{4C3BA45E-F6BF-4EAD-A0E0-58CFAB394E76}" type="datetimeFigureOut">
               <a:rPr lang="en-US" smtClean="0"/>
-              <a:t>8/24/2022</a:t>
+              <a:t>12/6/2022</a:t>
             </a:fld>
             <a:endParaRPr lang="en-US"/>
           </a:p>
@@ -10214,6 +10371,2126 @@
     <p:extLst>
       <p:ext uri="{BB962C8B-B14F-4D97-AF65-F5344CB8AC3E}">
         <p14:creationId xmlns:p14="http://schemas.microsoft.com/office/powerpoint/2010/main" val="2127013383"/>
+      </p:ext>
+    </p:extLst>
+  </p:cSld>
+  <p:clrMapOvr>
+    <a:masterClrMapping/>
+  </p:clrMapOvr>
+</p:sld>
+</file>
+
+<file path=ppt/slides/slide15.xml><?xml version="1.0" encoding="utf-8"?>
+<p:sld xmlns:a="http://schemas.openxmlformats.org/drawingml/2006/main" xmlns:r="http://schemas.openxmlformats.org/officeDocument/2006/relationships" xmlns:p="http://schemas.openxmlformats.org/presentationml/2006/main">
+  <p:cSld>
+    <p:spTree>
+      <p:nvGrpSpPr>
+        <p:cNvPr id="1" name=""/>
+        <p:cNvGrpSpPr/>
+        <p:nvPr/>
+      </p:nvGrpSpPr>
+      <p:grpSpPr>
+        <a:xfrm>
+          <a:off x="0" y="0"/>
+          <a:ext cx="0" cy="0"/>
+          <a:chOff x="0" y="0"/>
+          <a:chExt cx="0" cy="0"/>
+        </a:xfrm>
+      </p:grpSpPr>
+      <p:sp>
+        <p:nvSpPr>
+          <p:cNvPr id="135" name="Rectangle 134">
+            <a:extLst>
+              <a:ext uri="{FF2B5EF4-FFF2-40B4-BE49-F238E27FC236}">
+                <a16:creationId xmlns:a16="http://schemas.microsoft.com/office/drawing/2014/main" id="{950BB5E0-6EFA-FC1E-6323-8E9E34CD5372}"/>
+              </a:ext>
+            </a:extLst>
+          </p:cNvPr>
+          <p:cNvSpPr/>
+          <p:nvPr/>
+        </p:nvSpPr>
+        <p:spPr>
+          <a:xfrm>
+            <a:off x="8160287" y="1786543"/>
+            <a:ext cx="3397130" cy="3578191"/>
+          </a:xfrm>
+          <a:prstGeom prst="rect">
+            <a:avLst/>
+          </a:prstGeom>
+          <a:solidFill>
+            <a:schemeClr val="accent4">
+              <a:lumMod val="40000"/>
+              <a:lumOff val="60000"/>
+            </a:schemeClr>
+          </a:solidFill>
+          <a:ln>
+            <a:solidFill>
+              <a:schemeClr val="tx1"/>
+            </a:solidFill>
+          </a:ln>
+        </p:spPr>
+        <p:style>
+          <a:lnRef idx="2">
+            <a:schemeClr val="accent1">
+              <a:shade val="50000"/>
+            </a:schemeClr>
+          </a:lnRef>
+          <a:fillRef idx="1">
+            <a:schemeClr val="accent1"/>
+          </a:fillRef>
+          <a:effectRef idx="0">
+            <a:schemeClr val="accent1"/>
+          </a:effectRef>
+          <a:fontRef idx="minor">
+            <a:schemeClr val="lt1"/>
+          </a:fontRef>
+        </p:style>
+        <p:txBody>
+          <a:bodyPr rtlCol="0" anchor="ctr"/>
+          <a:lstStyle/>
+          <a:p>
+            <a:pPr algn="ctr"/>
+            <a:endParaRPr lang="en-US"/>
+          </a:p>
+        </p:txBody>
+      </p:sp>
+      <p:sp>
+        <p:nvSpPr>
+          <p:cNvPr id="93" name="Freeform: Shape 92">
+            <a:extLst>
+              <a:ext uri="{FF2B5EF4-FFF2-40B4-BE49-F238E27FC236}">
+                <a16:creationId xmlns:a16="http://schemas.microsoft.com/office/drawing/2014/main" id="{23618D75-6DAA-6D66-70F7-CD576E5CF125}"/>
+              </a:ext>
+            </a:extLst>
+          </p:cNvPr>
+          <p:cNvSpPr/>
+          <p:nvPr/>
+        </p:nvSpPr>
+        <p:spPr>
+          <a:xfrm>
+            <a:off x="427703" y="1873045"/>
+            <a:ext cx="3185652" cy="2831690"/>
+          </a:xfrm>
+          <a:custGeom>
+            <a:avLst/>
+            <a:gdLst>
+              <a:gd name="connsiteX0" fmla="*/ 0 w 3185652"/>
+              <a:gd name="connsiteY0" fmla="*/ 176981 h 2831690"/>
+              <a:gd name="connsiteX1" fmla="*/ 14749 w 3185652"/>
+              <a:gd name="connsiteY1" fmla="*/ 0 h 2831690"/>
+              <a:gd name="connsiteX2" fmla="*/ 3170903 w 3185652"/>
+              <a:gd name="connsiteY2" fmla="*/ 0 h 2831690"/>
+              <a:gd name="connsiteX3" fmla="*/ 3185652 w 3185652"/>
+              <a:gd name="connsiteY3" fmla="*/ 2831690 h 2831690"/>
+              <a:gd name="connsiteX4" fmla="*/ 1327355 w 3185652"/>
+              <a:gd name="connsiteY4" fmla="*/ 280220 h 2831690"/>
+              <a:gd name="connsiteX5" fmla="*/ 0 w 3185652"/>
+              <a:gd name="connsiteY5" fmla="*/ 176981 h 2831690"/>
+            </a:gdLst>
+            <a:ahLst/>
+            <a:cxnLst>
+              <a:cxn ang="0">
+                <a:pos x="connsiteX0" y="connsiteY0"/>
+              </a:cxn>
+              <a:cxn ang="0">
+                <a:pos x="connsiteX1" y="connsiteY1"/>
+              </a:cxn>
+              <a:cxn ang="0">
+                <a:pos x="connsiteX2" y="connsiteY2"/>
+              </a:cxn>
+              <a:cxn ang="0">
+                <a:pos x="connsiteX3" y="connsiteY3"/>
+              </a:cxn>
+              <a:cxn ang="0">
+                <a:pos x="connsiteX4" y="connsiteY4"/>
+              </a:cxn>
+              <a:cxn ang="0">
+                <a:pos x="connsiteX5" y="connsiteY5"/>
+              </a:cxn>
+            </a:cxnLst>
+            <a:rect l="l" t="t" r="r" b="b"/>
+            <a:pathLst>
+              <a:path w="3185652" h="2831690">
+                <a:moveTo>
+                  <a:pt x="0" y="176981"/>
+                </a:moveTo>
+                <a:lnTo>
+                  <a:pt x="14749" y="0"/>
+                </a:lnTo>
+                <a:lnTo>
+                  <a:pt x="3170903" y="0"/>
+                </a:lnTo>
+                <a:cubicBezTo>
+                  <a:pt x="3175819" y="943897"/>
+                  <a:pt x="3180736" y="1887793"/>
+                  <a:pt x="3185652" y="2831690"/>
+                </a:cubicBezTo>
+                <a:lnTo>
+                  <a:pt x="1327355" y="280220"/>
+                </a:lnTo>
+                <a:lnTo>
+                  <a:pt x="0" y="176981"/>
+                </a:lnTo>
+                <a:close/>
+              </a:path>
+            </a:pathLst>
+          </a:custGeom>
+          <a:solidFill>
+            <a:srgbClr val="FFC000"/>
+          </a:solidFill>
+        </p:spPr>
+        <p:style>
+          <a:lnRef idx="2">
+            <a:schemeClr val="accent1">
+              <a:shade val="50000"/>
+            </a:schemeClr>
+          </a:lnRef>
+          <a:fillRef idx="1">
+            <a:schemeClr val="accent1"/>
+          </a:fillRef>
+          <a:effectRef idx="0">
+            <a:schemeClr val="accent1"/>
+          </a:effectRef>
+          <a:fontRef idx="minor">
+            <a:schemeClr val="lt1"/>
+          </a:fontRef>
+        </p:style>
+        <p:txBody>
+          <a:bodyPr rtlCol="0" anchor="ctr"/>
+          <a:lstStyle/>
+          <a:p>
+            <a:pPr algn="ctr"/>
+            <a:endParaRPr lang="en-US"/>
+          </a:p>
+        </p:txBody>
+      </p:sp>
+      <p:sp>
+        <p:nvSpPr>
+          <p:cNvPr id="4" name="TextBox 3">
+            <a:extLst>
+              <a:ext uri="{FF2B5EF4-FFF2-40B4-BE49-F238E27FC236}">
+                <a16:creationId xmlns:a16="http://schemas.microsoft.com/office/drawing/2014/main" id="{F0B9D05E-B248-404F-F234-CAE78D43DBD9}"/>
+              </a:ext>
+            </a:extLst>
+          </p:cNvPr>
+          <p:cNvSpPr txBox="1"/>
+          <p:nvPr/>
+        </p:nvSpPr>
+        <p:spPr>
+          <a:xfrm>
+            <a:off x="273143" y="209269"/>
+            <a:ext cx="11746792" cy="646331"/>
+          </a:xfrm>
+          <a:prstGeom prst="rect">
+            <a:avLst/>
+          </a:prstGeom>
+          <a:noFill/>
+        </p:spPr>
+        <p:txBody>
+          <a:bodyPr wrap="square" rtlCol="0">
+            <a:spAutoFit/>
+          </a:bodyPr>
+          <a:lstStyle/>
+          <a:p>
+            <a:r>
+              <a:rPr lang="en-US" dirty="0">
+                <a:latin typeface="Arial" panose="020B0604020202020204" pitchFamily="34" charset="0"/>
+                <a:cs typeface="Arial" panose="020B0604020202020204" pitchFamily="34" charset="0"/>
+              </a:rPr>
+              <a:t>Under what circumstances can disturbance override background lake ecosystem drivers and trigger conversion to a new ecosystem state?</a:t>
+            </a:r>
+          </a:p>
+        </p:txBody>
+      </p:sp>
+      <p:cxnSp>
+        <p:nvCxnSpPr>
+          <p:cNvPr id="9" name="Straight Arrow Connector 8">
+            <a:extLst>
+              <a:ext uri="{FF2B5EF4-FFF2-40B4-BE49-F238E27FC236}">
+                <a16:creationId xmlns:a16="http://schemas.microsoft.com/office/drawing/2014/main" id="{B6E2A15D-B7B0-EAF5-ED53-AD29658A5F28}"/>
+              </a:ext>
+            </a:extLst>
+          </p:cNvPr>
+          <p:cNvCxnSpPr>
+            <a:cxnSpLocks/>
+          </p:cNvCxnSpPr>
+          <p:nvPr/>
+        </p:nvCxnSpPr>
+        <p:spPr>
+          <a:xfrm flipV="1">
+            <a:off x="433244" y="4697958"/>
+            <a:ext cx="3268601" cy="2630"/>
+          </a:xfrm>
+          <a:prstGeom prst="straightConnector1">
+            <a:avLst/>
+          </a:prstGeom>
+          <a:ln w="38100">
+            <a:solidFill>
+              <a:schemeClr val="tx1"/>
+            </a:solidFill>
+            <a:tailEnd type="triangle"/>
+          </a:ln>
+        </p:spPr>
+        <p:style>
+          <a:lnRef idx="1">
+            <a:schemeClr val="accent1"/>
+          </a:lnRef>
+          <a:fillRef idx="0">
+            <a:schemeClr val="accent1"/>
+          </a:fillRef>
+          <a:effectRef idx="0">
+            <a:schemeClr val="accent1"/>
+          </a:effectRef>
+          <a:fontRef idx="minor">
+            <a:schemeClr val="tx1"/>
+          </a:fontRef>
+        </p:style>
+      </p:cxnSp>
+      <p:cxnSp>
+        <p:nvCxnSpPr>
+          <p:cNvPr id="11" name="Straight Arrow Connector 10">
+            <a:extLst>
+              <a:ext uri="{FF2B5EF4-FFF2-40B4-BE49-F238E27FC236}">
+                <a16:creationId xmlns:a16="http://schemas.microsoft.com/office/drawing/2014/main" id="{2A71AD50-7A8A-A7DD-EF42-136C2E578FCF}"/>
+              </a:ext>
+            </a:extLst>
+          </p:cNvPr>
+          <p:cNvCxnSpPr>
+            <a:cxnSpLocks/>
+          </p:cNvCxnSpPr>
+          <p:nvPr/>
+        </p:nvCxnSpPr>
+        <p:spPr>
+          <a:xfrm flipV="1">
+            <a:off x="426099" y="1770057"/>
+            <a:ext cx="0" cy="2941024"/>
+          </a:xfrm>
+          <a:prstGeom prst="straightConnector1">
+            <a:avLst/>
+          </a:prstGeom>
+          <a:ln w="38100">
+            <a:solidFill>
+              <a:schemeClr val="tx1"/>
+            </a:solidFill>
+            <a:tailEnd type="triangle"/>
+          </a:ln>
+        </p:spPr>
+        <p:style>
+          <a:lnRef idx="1">
+            <a:schemeClr val="accent1"/>
+          </a:lnRef>
+          <a:fillRef idx="0">
+            <a:schemeClr val="accent1"/>
+          </a:fillRef>
+          <a:effectRef idx="0">
+            <a:schemeClr val="accent1"/>
+          </a:effectRef>
+          <a:fontRef idx="minor">
+            <a:schemeClr val="tx1"/>
+          </a:fontRef>
+        </p:style>
+      </p:cxnSp>
+      <p:sp>
+        <p:nvSpPr>
+          <p:cNvPr id="13" name="TextBox 12">
+            <a:extLst>
+              <a:ext uri="{FF2B5EF4-FFF2-40B4-BE49-F238E27FC236}">
+                <a16:creationId xmlns:a16="http://schemas.microsoft.com/office/drawing/2014/main" id="{3C1C2AF3-7BB7-9C1B-ACD2-C881E9F33193}"/>
+              </a:ext>
+            </a:extLst>
+          </p:cNvPr>
+          <p:cNvSpPr txBox="1"/>
+          <p:nvPr/>
+        </p:nvSpPr>
+        <p:spPr>
+          <a:xfrm>
+            <a:off x="433245" y="4757733"/>
+            <a:ext cx="3151684" cy="646331"/>
+          </a:xfrm>
+          <a:prstGeom prst="rect">
+            <a:avLst/>
+          </a:prstGeom>
+          <a:noFill/>
+        </p:spPr>
+        <p:txBody>
+          <a:bodyPr wrap="square" rtlCol="0">
+            <a:spAutoFit/>
+          </a:bodyPr>
+          <a:lstStyle/>
+          <a:p>
+            <a:pPr algn="ctr"/>
+            <a:r>
+              <a:rPr lang="en-US" b="1" dirty="0">
+                <a:latin typeface="Arial" panose="020B0604020202020204" pitchFamily="34" charset="0"/>
+                <a:cs typeface="Arial" panose="020B0604020202020204" pitchFamily="34" charset="0"/>
+              </a:rPr>
+              <a:t>Watershed disturbance gradient</a:t>
+            </a:r>
+          </a:p>
+        </p:txBody>
+      </p:sp>
+      <p:sp>
+        <p:nvSpPr>
+          <p:cNvPr id="14" name="TextBox 13">
+            <a:extLst>
+              <a:ext uri="{FF2B5EF4-FFF2-40B4-BE49-F238E27FC236}">
+                <a16:creationId xmlns:a16="http://schemas.microsoft.com/office/drawing/2014/main" id="{39355CA4-BA53-DEB4-58AB-40F804429274}"/>
+              </a:ext>
+            </a:extLst>
+          </p:cNvPr>
+          <p:cNvSpPr txBox="1"/>
+          <p:nvPr/>
+        </p:nvSpPr>
+        <p:spPr>
+          <a:xfrm rot="16200000">
+            <a:off x="-1199529" y="3106885"/>
+            <a:ext cx="2839062" cy="369332"/>
+          </a:xfrm>
+          <a:prstGeom prst="rect">
+            <a:avLst/>
+          </a:prstGeom>
+          <a:noFill/>
+        </p:spPr>
+        <p:txBody>
+          <a:bodyPr wrap="square" rtlCol="0">
+            <a:spAutoFit/>
+          </a:bodyPr>
+          <a:lstStyle/>
+          <a:p>
+            <a:pPr algn="ctr"/>
+            <a:r>
+              <a:rPr lang="en-US" b="1" dirty="0">
+                <a:latin typeface="Arial" panose="020B0604020202020204" pitchFamily="34" charset="0"/>
+                <a:cs typeface="Arial" panose="020B0604020202020204" pitchFamily="34" charset="0"/>
+              </a:rPr>
+              <a:t>Relative influence</a:t>
+            </a:r>
+          </a:p>
+        </p:txBody>
+      </p:sp>
+      <p:cxnSp>
+        <p:nvCxnSpPr>
+          <p:cNvPr id="16" name="Straight Connector 15">
+            <a:extLst>
+              <a:ext uri="{FF2B5EF4-FFF2-40B4-BE49-F238E27FC236}">
+                <a16:creationId xmlns:a16="http://schemas.microsoft.com/office/drawing/2014/main" id="{B930D43A-A2F5-9B61-D09B-42B45992A4AA}"/>
+              </a:ext>
+            </a:extLst>
+          </p:cNvPr>
+          <p:cNvCxnSpPr>
+            <a:cxnSpLocks/>
+          </p:cNvCxnSpPr>
+          <p:nvPr/>
+        </p:nvCxnSpPr>
+        <p:spPr>
+          <a:xfrm>
+            <a:off x="418951" y="2053080"/>
+            <a:ext cx="1326739" cy="111271"/>
+          </a:xfrm>
+          <a:prstGeom prst="line">
+            <a:avLst/>
+          </a:prstGeom>
+          <a:ln w="38100">
+            <a:solidFill>
+              <a:schemeClr val="tx1"/>
+            </a:solidFill>
+          </a:ln>
+        </p:spPr>
+        <p:style>
+          <a:lnRef idx="1">
+            <a:schemeClr val="accent1"/>
+          </a:lnRef>
+          <a:fillRef idx="0">
+            <a:schemeClr val="accent1"/>
+          </a:fillRef>
+          <a:effectRef idx="0">
+            <a:schemeClr val="accent1"/>
+          </a:effectRef>
+          <a:fontRef idx="minor">
+            <a:schemeClr val="tx1"/>
+          </a:fontRef>
+        </p:style>
+      </p:cxnSp>
+      <p:cxnSp>
+        <p:nvCxnSpPr>
+          <p:cNvPr id="22" name="Straight Connector 21">
+            <a:extLst>
+              <a:ext uri="{FF2B5EF4-FFF2-40B4-BE49-F238E27FC236}">
+                <a16:creationId xmlns:a16="http://schemas.microsoft.com/office/drawing/2014/main" id="{22399840-FF5F-1DF5-FA71-7F05B9AACC05}"/>
+              </a:ext>
+            </a:extLst>
+          </p:cNvPr>
+          <p:cNvCxnSpPr>
+            <a:cxnSpLocks/>
+            <a:endCxn id="93" idx="2"/>
+          </p:cNvCxnSpPr>
+          <p:nvPr/>
+        </p:nvCxnSpPr>
+        <p:spPr>
+          <a:xfrm>
+            <a:off x="433244" y="1872020"/>
+            <a:ext cx="3165362" cy="1025"/>
+          </a:xfrm>
+          <a:prstGeom prst="line">
+            <a:avLst/>
+          </a:prstGeom>
+          <a:ln w="38100">
+            <a:solidFill>
+              <a:schemeClr val="tx1"/>
+            </a:solidFill>
+            <a:prstDash val="solid"/>
+          </a:ln>
+        </p:spPr>
+        <p:style>
+          <a:lnRef idx="1">
+            <a:schemeClr val="accent1"/>
+          </a:lnRef>
+          <a:fillRef idx="0">
+            <a:schemeClr val="accent1"/>
+          </a:fillRef>
+          <a:effectRef idx="0">
+            <a:schemeClr val="accent1"/>
+          </a:effectRef>
+          <a:fontRef idx="minor">
+            <a:schemeClr val="tx1"/>
+          </a:fontRef>
+        </p:style>
+      </p:cxnSp>
+      <p:cxnSp>
+        <p:nvCxnSpPr>
+          <p:cNvPr id="25" name="Straight Connector 24">
+            <a:extLst>
+              <a:ext uri="{FF2B5EF4-FFF2-40B4-BE49-F238E27FC236}">
+                <a16:creationId xmlns:a16="http://schemas.microsoft.com/office/drawing/2014/main" id="{C0514133-4D9D-E078-C52C-04939AC524ED}"/>
+              </a:ext>
+            </a:extLst>
+          </p:cNvPr>
+          <p:cNvCxnSpPr>
+            <a:cxnSpLocks/>
+          </p:cNvCxnSpPr>
+          <p:nvPr/>
+        </p:nvCxnSpPr>
+        <p:spPr>
+          <a:xfrm>
+            <a:off x="3592068" y="1872020"/>
+            <a:ext cx="0" cy="2797366"/>
+          </a:xfrm>
+          <a:prstGeom prst="line">
+            <a:avLst/>
+          </a:prstGeom>
+          <a:ln w="38100">
+            <a:solidFill>
+              <a:schemeClr val="tx1"/>
+            </a:solidFill>
+            <a:prstDash val="solid"/>
+          </a:ln>
+        </p:spPr>
+        <p:style>
+          <a:lnRef idx="1">
+            <a:schemeClr val="accent1"/>
+          </a:lnRef>
+          <a:fillRef idx="0">
+            <a:schemeClr val="accent1"/>
+          </a:fillRef>
+          <a:effectRef idx="0">
+            <a:schemeClr val="accent1"/>
+          </a:effectRef>
+          <a:fontRef idx="minor">
+            <a:schemeClr val="tx1"/>
+          </a:fontRef>
+        </p:style>
+      </p:cxnSp>
+      <p:sp>
+        <p:nvSpPr>
+          <p:cNvPr id="34" name="TextBox 33">
+            <a:extLst>
+              <a:ext uri="{FF2B5EF4-FFF2-40B4-BE49-F238E27FC236}">
+                <a16:creationId xmlns:a16="http://schemas.microsoft.com/office/drawing/2014/main" id="{2F80FB18-A18D-9AB1-35ED-A71051B98FF3}"/>
+              </a:ext>
+            </a:extLst>
+          </p:cNvPr>
+          <p:cNvSpPr txBox="1"/>
+          <p:nvPr/>
+        </p:nvSpPr>
+        <p:spPr>
+          <a:xfrm>
+            <a:off x="2883761" y="3166718"/>
+            <a:ext cx="647710" cy="369332"/>
+          </a:xfrm>
+          <a:prstGeom prst="rect">
+            <a:avLst/>
+          </a:prstGeom>
+          <a:solidFill>
+            <a:schemeClr val="bg1"/>
+          </a:solidFill>
+          <a:ln>
+            <a:solidFill>
+              <a:schemeClr val="tx1"/>
+            </a:solidFill>
+          </a:ln>
+        </p:spPr>
+        <p:txBody>
+          <a:bodyPr wrap="square" rtlCol="0">
+            <a:spAutoFit/>
+          </a:bodyPr>
+          <a:lstStyle/>
+          <a:p>
+            <a:pPr algn="ctr"/>
+            <a:r>
+              <a:rPr lang="en-US" b="1" dirty="0">
+                <a:latin typeface="Arial" panose="020B0604020202020204" pitchFamily="34" charset="0"/>
+                <a:cs typeface="Arial" panose="020B0604020202020204" pitchFamily="34" charset="0"/>
+              </a:rPr>
+              <a:t>Fire</a:t>
+            </a:r>
+          </a:p>
+        </p:txBody>
+      </p:sp>
+      <p:cxnSp>
+        <p:nvCxnSpPr>
+          <p:cNvPr id="40" name="Straight Connector 39">
+            <a:extLst>
+              <a:ext uri="{FF2B5EF4-FFF2-40B4-BE49-F238E27FC236}">
+                <a16:creationId xmlns:a16="http://schemas.microsoft.com/office/drawing/2014/main" id="{84F003B9-170B-E410-EAA9-0413C70D16A1}"/>
+              </a:ext>
+            </a:extLst>
+          </p:cNvPr>
+          <p:cNvCxnSpPr>
+            <a:cxnSpLocks/>
+          </p:cNvCxnSpPr>
+          <p:nvPr/>
+        </p:nvCxnSpPr>
+        <p:spPr>
+          <a:xfrm>
+            <a:off x="1752575" y="2155875"/>
+            <a:ext cx="1832353" cy="2539452"/>
+          </a:xfrm>
+          <a:prstGeom prst="line">
+            <a:avLst/>
+          </a:prstGeom>
+          <a:ln w="38100">
+            <a:solidFill>
+              <a:schemeClr val="tx1"/>
+            </a:solidFill>
+          </a:ln>
+        </p:spPr>
+        <p:style>
+          <a:lnRef idx="1">
+            <a:schemeClr val="accent1"/>
+          </a:lnRef>
+          <a:fillRef idx="0">
+            <a:schemeClr val="accent1"/>
+          </a:fillRef>
+          <a:effectRef idx="0">
+            <a:schemeClr val="accent1"/>
+          </a:effectRef>
+          <a:fontRef idx="minor">
+            <a:schemeClr val="tx1"/>
+          </a:fontRef>
+        </p:style>
+      </p:cxnSp>
+      <p:cxnSp>
+        <p:nvCxnSpPr>
+          <p:cNvPr id="43" name="Straight Connector 42">
+            <a:extLst>
+              <a:ext uri="{FF2B5EF4-FFF2-40B4-BE49-F238E27FC236}">
+                <a16:creationId xmlns:a16="http://schemas.microsoft.com/office/drawing/2014/main" id="{E784F398-1956-FBF1-D9FA-13AD83E56DD3}"/>
+              </a:ext>
+            </a:extLst>
+          </p:cNvPr>
+          <p:cNvCxnSpPr>
+            <a:cxnSpLocks/>
+          </p:cNvCxnSpPr>
+          <p:nvPr/>
+        </p:nvCxnSpPr>
+        <p:spPr>
+          <a:xfrm>
+            <a:off x="1756610" y="1872020"/>
+            <a:ext cx="0" cy="2810157"/>
+          </a:xfrm>
+          <a:prstGeom prst="line">
+            <a:avLst/>
+          </a:prstGeom>
+          <a:ln w="28575">
+            <a:solidFill>
+              <a:schemeClr val="tx1"/>
+            </a:solidFill>
+            <a:prstDash val="dash"/>
+          </a:ln>
+        </p:spPr>
+        <p:style>
+          <a:lnRef idx="1">
+            <a:schemeClr val="accent1"/>
+          </a:lnRef>
+          <a:fillRef idx="0">
+            <a:schemeClr val="accent1"/>
+          </a:fillRef>
+          <a:effectRef idx="0">
+            <a:schemeClr val="accent1"/>
+          </a:effectRef>
+          <a:fontRef idx="minor">
+            <a:schemeClr val="tx1"/>
+          </a:fontRef>
+        </p:style>
+      </p:cxnSp>
+      <p:sp>
+        <p:nvSpPr>
+          <p:cNvPr id="35" name="TextBox 34">
+            <a:extLst>
+              <a:ext uri="{FF2B5EF4-FFF2-40B4-BE49-F238E27FC236}">
+                <a16:creationId xmlns:a16="http://schemas.microsoft.com/office/drawing/2014/main" id="{D854EE82-E9B3-99CA-0091-4AEAC9C20ED6}"/>
+              </a:ext>
+            </a:extLst>
+          </p:cNvPr>
+          <p:cNvSpPr txBox="1"/>
+          <p:nvPr/>
+        </p:nvSpPr>
+        <p:spPr>
+          <a:xfrm>
+            <a:off x="535877" y="4044772"/>
+            <a:ext cx="2445414" cy="369332"/>
+          </a:xfrm>
+          <a:prstGeom prst="rect">
+            <a:avLst/>
+          </a:prstGeom>
+          <a:solidFill>
+            <a:schemeClr val="bg1"/>
+          </a:solidFill>
+          <a:ln>
+            <a:solidFill>
+              <a:schemeClr val="tx1"/>
+            </a:solidFill>
+          </a:ln>
+        </p:spPr>
+        <p:txBody>
+          <a:bodyPr wrap="square" rtlCol="0">
+            <a:spAutoFit/>
+          </a:bodyPr>
+          <a:lstStyle/>
+          <a:p>
+            <a:pPr algn="ctr"/>
+            <a:r>
+              <a:rPr lang="en-US" b="1" dirty="0">
+                <a:latin typeface="Arial" panose="020B0604020202020204" pitchFamily="34" charset="0"/>
+                <a:cs typeface="Arial" panose="020B0604020202020204" pitchFamily="34" charset="0"/>
+              </a:rPr>
+              <a:t>Background drivers</a:t>
+            </a:r>
+          </a:p>
+        </p:txBody>
+      </p:sp>
+      <p:sp>
+        <p:nvSpPr>
+          <p:cNvPr id="49" name="TextBox 48">
+            <a:extLst>
+              <a:ext uri="{FF2B5EF4-FFF2-40B4-BE49-F238E27FC236}">
+                <a16:creationId xmlns:a16="http://schemas.microsoft.com/office/drawing/2014/main" id="{3DD8C4CC-31DC-2D4D-06E4-C48705A6C5A1}"/>
+              </a:ext>
+            </a:extLst>
+          </p:cNvPr>
+          <p:cNvSpPr txBox="1"/>
+          <p:nvPr/>
+        </p:nvSpPr>
+        <p:spPr>
+          <a:xfrm>
+            <a:off x="1" y="5666035"/>
+            <a:ext cx="12192000" cy="1169551"/>
+          </a:xfrm>
+          <a:prstGeom prst="rect">
+            <a:avLst/>
+          </a:prstGeom>
+          <a:noFill/>
+        </p:spPr>
+        <p:txBody>
+          <a:bodyPr wrap="square" rtlCol="0">
+            <a:spAutoFit/>
+          </a:bodyPr>
+          <a:lstStyle/>
+          <a:p>
+            <a:r>
+              <a:rPr lang="en-US" sz="1400" dirty="0">
+                <a:latin typeface="Arial" panose="020B0604020202020204" pitchFamily="34" charset="0"/>
+                <a:cs typeface="Arial" panose="020B0604020202020204" pitchFamily="34" charset="0"/>
+              </a:rPr>
+              <a:t>A) The relative influence of fire vs. background drivers on lake ecosystems rapidly increases along a watershed disturbance gradient beyond a critical threshold of watershed disturbance. B) Critical thresholds of watershed disturbance are not the same across all lakes and watersheds; fire-sensitive ecosystems have lower critical thresholds. C) Ecosystem fire sensitivity is influenced by several local lake and watershed variables, including depth, drainage ratio, water clarity, nutrient concentration and hydrologic connectivity. These variables influence the physical/chemical lake environment and therefore may override fire-derived inputs of nutrients, sediments and organic carbon.</a:t>
+            </a:r>
+          </a:p>
+        </p:txBody>
+      </p:sp>
+      <p:sp>
+        <p:nvSpPr>
+          <p:cNvPr id="50" name="TextBox 49">
+            <a:extLst>
+              <a:ext uri="{FF2B5EF4-FFF2-40B4-BE49-F238E27FC236}">
+                <a16:creationId xmlns:a16="http://schemas.microsoft.com/office/drawing/2014/main" id="{C99FE115-7D0A-C18F-28FC-96A38FAD518B}"/>
+              </a:ext>
+            </a:extLst>
+          </p:cNvPr>
+          <p:cNvSpPr txBox="1"/>
+          <p:nvPr/>
+        </p:nvSpPr>
+        <p:spPr>
+          <a:xfrm>
+            <a:off x="2187297" y="1933568"/>
+            <a:ext cx="1316281" cy="646331"/>
+          </a:xfrm>
+          <a:prstGeom prst="rect">
+            <a:avLst/>
+          </a:prstGeom>
+          <a:solidFill>
+            <a:schemeClr val="bg1"/>
+          </a:solidFill>
+          <a:ln>
+            <a:solidFill>
+              <a:schemeClr val="tx1"/>
+            </a:solidFill>
+          </a:ln>
+        </p:spPr>
+        <p:txBody>
+          <a:bodyPr wrap="square" rtlCol="0">
+            <a:spAutoFit/>
+          </a:bodyPr>
+          <a:lstStyle/>
+          <a:p>
+            <a:pPr algn="ctr"/>
+            <a:r>
+              <a:rPr lang="en-US" b="1" dirty="0">
+                <a:latin typeface="Arial" panose="020B0604020202020204" pitchFamily="34" charset="0"/>
+                <a:cs typeface="Arial" panose="020B0604020202020204" pitchFamily="34" charset="0"/>
+              </a:rPr>
+              <a:t>Critical threshold</a:t>
+            </a:r>
+          </a:p>
+        </p:txBody>
+      </p:sp>
+      <p:cxnSp>
+        <p:nvCxnSpPr>
+          <p:cNvPr id="52" name="Straight Arrow Connector 51">
+            <a:extLst>
+              <a:ext uri="{FF2B5EF4-FFF2-40B4-BE49-F238E27FC236}">
+                <a16:creationId xmlns:a16="http://schemas.microsoft.com/office/drawing/2014/main" id="{F7B9BD4A-713A-CFC3-869D-FF59917255BE}"/>
+              </a:ext>
+            </a:extLst>
+          </p:cNvPr>
+          <p:cNvCxnSpPr>
+            <a:cxnSpLocks/>
+            <a:stCxn id="50" idx="1"/>
+          </p:cNvCxnSpPr>
+          <p:nvPr/>
+        </p:nvCxnSpPr>
+        <p:spPr>
+          <a:xfrm flipH="1">
+            <a:off x="1825763" y="2256734"/>
+            <a:ext cx="361534" cy="383688"/>
+          </a:xfrm>
+          <a:prstGeom prst="straightConnector1">
+            <a:avLst/>
+          </a:prstGeom>
+          <a:ln w="38100">
+            <a:solidFill>
+              <a:schemeClr val="tx1"/>
+            </a:solidFill>
+            <a:tailEnd type="triangle"/>
+          </a:ln>
+        </p:spPr>
+        <p:style>
+          <a:lnRef idx="1">
+            <a:schemeClr val="accent1"/>
+          </a:lnRef>
+          <a:fillRef idx="0">
+            <a:schemeClr val="accent1"/>
+          </a:fillRef>
+          <a:effectRef idx="0">
+            <a:schemeClr val="accent1"/>
+          </a:effectRef>
+          <a:fontRef idx="minor">
+            <a:schemeClr val="tx1"/>
+          </a:fontRef>
+        </p:style>
+      </p:cxnSp>
+      <p:cxnSp>
+        <p:nvCxnSpPr>
+          <p:cNvPr id="97" name="Straight Arrow Connector 96">
+            <a:extLst>
+              <a:ext uri="{FF2B5EF4-FFF2-40B4-BE49-F238E27FC236}">
+                <a16:creationId xmlns:a16="http://schemas.microsoft.com/office/drawing/2014/main" id="{1FC40FFC-509F-827A-8260-62902A330216}"/>
+              </a:ext>
+            </a:extLst>
+          </p:cNvPr>
+          <p:cNvCxnSpPr>
+            <a:cxnSpLocks/>
+          </p:cNvCxnSpPr>
+          <p:nvPr/>
+        </p:nvCxnSpPr>
+        <p:spPr>
+          <a:xfrm flipV="1">
+            <a:off x="4234255" y="4697957"/>
+            <a:ext cx="3268601" cy="2630"/>
+          </a:xfrm>
+          <a:prstGeom prst="straightConnector1">
+            <a:avLst/>
+          </a:prstGeom>
+          <a:ln w="38100">
+            <a:solidFill>
+              <a:schemeClr val="tx1"/>
+            </a:solidFill>
+            <a:tailEnd type="triangle"/>
+          </a:ln>
+        </p:spPr>
+        <p:style>
+          <a:lnRef idx="1">
+            <a:schemeClr val="accent1"/>
+          </a:lnRef>
+          <a:fillRef idx="0">
+            <a:schemeClr val="accent1"/>
+          </a:fillRef>
+          <a:effectRef idx="0">
+            <a:schemeClr val="accent1"/>
+          </a:effectRef>
+          <a:fontRef idx="minor">
+            <a:schemeClr val="tx1"/>
+          </a:fontRef>
+        </p:style>
+      </p:cxnSp>
+      <p:cxnSp>
+        <p:nvCxnSpPr>
+          <p:cNvPr id="98" name="Straight Arrow Connector 97">
+            <a:extLst>
+              <a:ext uri="{FF2B5EF4-FFF2-40B4-BE49-F238E27FC236}">
+                <a16:creationId xmlns:a16="http://schemas.microsoft.com/office/drawing/2014/main" id="{7E5B39D3-03E0-D777-616A-49CBE336F773}"/>
+              </a:ext>
+            </a:extLst>
+          </p:cNvPr>
+          <p:cNvCxnSpPr>
+            <a:cxnSpLocks/>
+          </p:cNvCxnSpPr>
+          <p:nvPr/>
+        </p:nvCxnSpPr>
+        <p:spPr>
+          <a:xfrm flipV="1">
+            <a:off x="4227110" y="1770056"/>
+            <a:ext cx="0" cy="2941024"/>
+          </a:xfrm>
+          <a:prstGeom prst="straightConnector1">
+            <a:avLst/>
+          </a:prstGeom>
+          <a:ln w="38100">
+            <a:solidFill>
+              <a:schemeClr val="tx1"/>
+            </a:solidFill>
+            <a:tailEnd type="triangle"/>
+          </a:ln>
+        </p:spPr>
+        <p:style>
+          <a:lnRef idx="1">
+            <a:schemeClr val="accent1"/>
+          </a:lnRef>
+          <a:fillRef idx="0">
+            <a:schemeClr val="accent1"/>
+          </a:fillRef>
+          <a:effectRef idx="0">
+            <a:schemeClr val="accent1"/>
+          </a:effectRef>
+          <a:fontRef idx="minor">
+            <a:schemeClr val="tx1"/>
+          </a:fontRef>
+        </p:style>
+      </p:cxnSp>
+      <p:sp>
+        <p:nvSpPr>
+          <p:cNvPr id="99" name="TextBox 98">
+            <a:extLst>
+              <a:ext uri="{FF2B5EF4-FFF2-40B4-BE49-F238E27FC236}">
+                <a16:creationId xmlns:a16="http://schemas.microsoft.com/office/drawing/2014/main" id="{05798E7C-C80C-7119-4F6F-EE2BF5B6A69F}"/>
+              </a:ext>
+            </a:extLst>
+          </p:cNvPr>
+          <p:cNvSpPr txBox="1"/>
+          <p:nvPr/>
+        </p:nvSpPr>
+        <p:spPr>
+          <a:xfrm>
+            <a:off x="4234256" y="4757732"/>
+            <a:ext cx="3318454" cy="369332"/>
+          </a:xfrm>
+          <a:prstGeom prst="rect">
+            <a:avLst/>
+          </a:prstGeom>
+          <a:noFill/>
+        </p:spPr>
+        <p:txBody>
+          <a:bodyPr wrap="square" rtlCol="0">
+            <a:spAutoFit/>
+          </a:bodyPr>
+          <a:lstStyle/>
+          <a:p>
+            <a:pPr algn="ctr"/>
+            <a:r>
+              <a:rPr lang="en-US" b="1" dirty="0">
+                <a:latin typeface="Arial" panose="020B0604020202020204" pitchFamily="34" charset="0"/>
+                <a:cs typeface="Arial" panose="020B0604020202020204" pitchFamily="34" charset="0"/>
+              </a:rPr>
+              <a:t>Ecosystem fire sensitivity</a:t>
+            </a:r>
+          </a:p>
+        </p:txBody>
+      </p:sp>
+      <p:sp>
+        <p:nvSpPr>
+          <p:cNvPr id="100" name="TextBox 99">
+            <a:extLst>
+              <a:ext uri="{FF2B5EF4-FFF2-40B4-BE49-F238E27FC236}">
+                <a16:creationId xmlns:a16="http://schemas.microsoft.com/office/drawing/2014/main" id="{6AE8351C-58E9-71F1-A3CC-8F7055D26A96}"/>
+              </a:ext>
+            </a:extLst>
+          </p:cNvPr>
+          <p:cNvSpPr txBox="1"/>
+          <p:nvPr/>
+        </p:nvSpPr>
+        <p:spPr>
+          <a:xfrm rot="16200000">
+            <a:off x="2653103" y="3116811"/>
+            <a:ext cx="2735819" cy="369332"/>
+          </a:xfrm>
+          <a:prstGeom prst="rect">
+            <a:avLst/>
+          </a:prstGeom>
+          <a:noFill/>
+        </p:spPr>
+        <p:txBody>
+          <a:bodyPr wrap="square" rtlCol="0">
+            <a:spAutoFit/>
+          </a:bodyPr>
+          <a:lstStyle/>
+          <a:p>
+            <a:pPr algn="ctr"/>
+            <a:r>
+              <a:rPr lang="en-US" b="1" dirty="0">
+                <a:latin typeface="Arial" panose="020B0604020202020204" pitchFamily="34" charset="0"/>
+                <a:cs typeface="Arial" panose="020B0604020202020204" pitchFamily="34" charset="0"/>
+              </a:rPr>
+              <a:t>Critical threshold</a:t>
+            </a:r>
+          </a:p>
+        </p:txBody>
+      </p:sp>
+      <p:cxnSp>
+        <p:nvCxnSpPr>
+          <p:cNvPr id="102" name="Straight Connector 101">
+            <a:extLst>
+              <a:ext uri="{FF2B5EF4-FFF2-40B4-BE49-F238E27FC236}">
+                <a16:creationId xmlns:a16="http://schemas.microsoft.com/office/drawing/2014/main" id="{48A7F979-4791-8C87-0CCD-13A7AE2A4A82}"/>
+              </a:ext>
+            </a:extLst>
+          </p:cNvPr>
+          <p:cNvCxnSpPr>
+            <a:cxnSpLocks/>
+          </p:cNvCxnSpPr>
+          <p:nvPr/>
+        </p:nvCxnSpPr>
+        <p:spPr>
+          <a:xfrm>
+            <a:off x="4409772" y="2053080"/>
+            <a:ext cx="2743200" cy="2616306"/>
+          </a:xfrm>
+          <a:prstGeom prst="line">
+            <a:avLst/>
+          </a:prstGeom>
+          <a:ln w="28575">
+            <a:solidFill>
+              <a:schemeClr val="tx1"/>
+            </a:solidFill>
+            <a:prstDash val="sysDash"/>
+          </a:ln>
+        </p:spPr>
+        <p:style>
+          <a:lnRef idx="1">
+            <a:schemeClr val="accent1"/>
+          </a:lnRef>
+          <a:fillRef idx="0">
+            <a:schemeClr val="accent1"/>
+          </a:fillRef>
+          <a:effectRef idx="0">
+            <a:schemeClr val="accent1"/>
+          </a:effectRef>
+          <a:fontRef idx="minor">
+            <a:schemeClr val="tx1"/>
+          </a:fontRef>
+        </p:style>
+      </p:cxnSp>
+      <p:cxnSp>
+        <p:nvCxnSpPr>
+          <p:cNvPr id="104" name="Straight Arrow Connector 103">
+            <a:extLst>
+              <a:ext uri="{FF2B5EF4-FFF2-40B4-BE49-F238E27FC236}">
+                <a16:creationId xmlns:a16="http://schemas.microsoft.com/office/drawing/2014/main" id="{D1CC0CCF-516D-C2F6-68B6-337E1EB314D2}"/>
+              </a:ext>
+            </a:extLst>
+          </p:cNvPr>
+          <p:cNvCxnSpPr>
+            <a:cxnSpLocks/>
+          </p:cNvCxnSpPr>
+          <p:nvPr/>
+        </p:nvCxnSpPr>
+        <p:spPr>
+          <a:xfrm flipV="1">
+            <a:off x="8263890" y="2183977"/>
+            <a:ext cx="3268601" cy="2630"/>
+          </a:xfrm>
+          <a:prstGeom prst="straightConnector1">
+            <a:avLst/>
+          </a:prstGeom>
+          <a:ln w="38100">
+            <a:solidFill>
+              <a:srgbClr val="FFC000"/>
+            </a:solidFill>
+            <a:tailEnd type="triangle"/>
+          </a:ln>
+        </p:spPr>
+        <p:style>
+          <a:lnRef idx="1">
+            <a:schemeClr val="accent1"/>
+          </a:lnRef>
+          <a:fillRef idx="0">
+            <a:schemeClr val="accent1"/>
+          </a:fillRef>
+          <a:effectRef idx="0">
+            <a:schemeClr val="accent1"/>
+          </a:effectRef>
+          <a:fontRef idx="minor">
+            <a:schemeClr val="tx1"/>
+          </a:fontRef>
+        </p:style>
+      </p:cxnSp>
+      <p:sp>
+        <p:nvSpPr>
+          <p:cNvPr id="106" name="TextBox 105">
+            <a:extLst>
+              <a:ext uri="{FF2B5EF4-FFF2-40B4-BE49-F238E27FC236}">
+                <a16:creationId xmlns:a16="http://schemas.microsoft.com/office/drawing/2014/main" id="{CB04C33E-165E-8EE7-E75B-DF9085AACEFE}"/>
+              </a:ext>
+            </a:extLst>
+          </p:cNvPr>
+          <p:cNvSpPr txBox="1"/>
+          <p:nvPr/>
+        </p:nvSpPr>
+        <p:spPr>
+          <a:xfrm>
+            <a:off x="8238963" y="1786543"/>
+            <a:ext cx="3318454" cy="369332"/>
+          </a:xfrm>
+          <a:prstGeom prst="rect">
+            <a:avLst/>
+          </a:prstGeom>
+          <a:noFill/>
+        </p:spPr>
+        <p:txBody>
+          <a:bodyPr wrap="square" rtlCol="0">
+            <a:spAutoFit/>
+          </a:bodyPr>
+          <a:lstStyle/>
+          <a:p>
+            <a:pPr algn="ctr"/>
+            <a:r>
+              <a:rPr lang="en-US" b="1" dirty="0">
+                <a:latin typeface="Arial" panose="020B0604020202020204" pitchFamily="34" charset="0"/>
+                <a:cs typeface="Arial" panose="020B0604020202020204" pitchFamily="34" charset="0"/>
+              </a:rPr>
+              <a:t>Ecosystem fire sensitivity</a:t>
+            </a:r>
+          </a:p>
+        </p:txBody>
+      </p:sp>
+      <p:sp>
+        <p:nvSpPr>
+          <p:cNvPr id="109" name="TextBox 108">
+            <a:extLst>
+              <a:ext uri="{FF2B5EF4-FFF2-40B4-BE49-F238E27FC236}">
+                <a16:creationId xmlns:a16="http://schemas.microsoft.com/office/drawing/2014/main" id="{2F099730-4E4D-4D9B-F50F-3D318FE2F774}"/>
+              </a:ext>
+            </a:extLst>
+          </p:cNvPr>
+          <p:cNvSpPr txBox="1"/>
+          <p:nvPr/>
+        </p:nvSpPr>
+        <p:spPr>
+          <a:xfrm>
+            <a:off x="8270791" y="2254564"/>
+            <a:ext cx="3261700" cy="307777"/>
+          </a:xfrm>
+          <a:prstGeom prst="rect">
+            <a:avLst/>
+          </a:prstGeom>
+          <a:noFill/>
+        </p:spPr>
+        <p:txBody>
+          <a:bodyPr wrap="square" rtlCol="0">
+            <a:spAutoFit/>
+          </a:bodyPr>
+          <a:lstStyle/>
+          <a:p>
+            <a:pPr algn="ctr"/>
+            <a:r>
+              <a:rPr lang="en-US" sz="1400" dirty="0">
+                <a:latin typeface="Arial" panose="020B0604020202020204" pitchFamily="34" charset="0"/>
+                <a:cs typeface="Arial" panose="020B0604020202020204" pitchFamily="34" charset="0"/>
+              </a:rPr>
+              <a:t>Lake depth</a:t>
+            </a:r>
+          </a:p>
+        </p:txBody>
+      </p:sp>
+      <p:sp>
+        <p:nvSpPr>
+          <p:cNvPr id="110" name="TextBox 109">
+            <a:extLst>
+              <a:ext uri="{FF2B5EF4-FFF2-40B4-BE49-F238E27FC236}">
+                <a16:creationId xmlns:a16="http://schemas.microsoft.com/office/drawing/2014/main" id="{AAD96523-1B0D-FFC5-069B-5769C38C62FC}"/>
+              </a:ext>
+            </a:extLst>
+          </p:cNvPr>
+          <p:cNvSpPr txBox="1"/>
+          <p:nvPr/>
+        </p:nvSpPr>
+        <p:spPr>
+          <a:xfrm>
+            <a:off x="8270791" y="2791251"/>
+            <a:ext cx="3261700" cy="307777"/>
+          </a:xfrm>
+          <a:prstGeom prst="rect">
+            <a:avLst/>
+          </a:prstGeom>
+          <a:noFill/>
+        </p:spPr>
+        <p:txBody>
+          <a:bodyPr wrap="square" rtlCol="0">
+            <a:spAutoFit/>
+          </a:bodyPr>
+          <a:lstStyle/>
+          <a:p>
+            <a:pPr algn="ctr"/>
+            <a:r>
+              <a:rPr lang="en-US" sz="1400" dirty="0">
+                <a:latin typeface="Arial" panose="020B0604020202020204" pitchFamily="34" charset="0"/>
+                <a:cs typeface="Arial" panose="020B0604020202020204" pitchFamily="34" charset="0"/>
+              </a:rPr>
+              <a:t>Drainage ratio</a:t>
+            </a:r>
+          </a:p>
+        </p:txBody>
+      </p:sp>
+      <p:sp>
+        <p:nvSpPr>
+          <p:cNvPr id="114" name="TextBox 113">
+            <a:extLst>
+              <a:ext uri="{FF2B5EF4-FFF2-40B4-BE49-F238E27FC236}">
+                <a16:creationId xmlns:a16="http://schemas.microsoft.com/office/drawing/2014/main" id="{0D8E6712-F1E5-DA95-83D9-D23068D42E5C}"/>
+              </a:ext>
+            </a:extLst>
+          </p:cNvPr>
+          <p:cNvSpPr txBox="1"/>
+          <p:nvPr/>
+        </p:nvSpPr>
+        <p:spPr>
+          <a:xfrm>
+            <a:off x="12362645" y="2211672"/>
+            <a:ext cx="2798697" cy="2554545"/>
+          </a:xfrm>
+          <a:prstGeom prst="rect">
+            <a:avLst/>
+          </a:prstGeom>
+          <a:noFill/>
+        </p:spPr>
+        <p:txBody>
+          <a:bodyPr wrap="square" rtlCol="0">
+            <a:spAutoFit/>
+          </a:bodyPr>
+          <a:lstStyle/>
+          <a:p>
+            <a:r>
+              <a:rPr lang="en-US" sz="1600" dirty="0">
+                <a:latin typeface="Arial" panose="020B0604020202020204" pitchFamily="34" charset="0"/>
+                <a:cs typeface="Arial" panose="020B0604020202020204" pitchFamily="34" charset="0"/>
+              </a:rPr>
+              <a:t>Others? </a:t>
+            </a:r>
+          </a:p>
+          <a:p>
+            <a:r>
+              <a:rPr lang="en-US" sz="1600" dirty="0">
+                <a:latin typeface="Arial" panose="020B0604020202020204" pitchFamily="34" charset="0"/>
+                <a:cs typeface="Arial" panose="020B0604020202020204" pitchFamily="34" charset="0"/>
+              </a:rPr>
+              <a:t>Lake scale: Sediment properties, food web dynamics, </a:t>
+            </a:r>
+          </a:p>
+          <a:p>
+            <a:endParaRPr lang="en-US" sz="1600" dirty="0">
+              <a:latin typeface="Arial" panose="020B0604020202020204" pitchFamily="34" charset="0"/>
+              <a:cs typeface="Arial" panose="020B0604020202020204" pitchFamily="34" charset="0"/>
+            </a:endParaRPr>
+          </a:p>
+          <a:p>
+            <a:r>
+              <a:rPr lang="en-US" sz="1600" dirty="0">
+                <a:latin typeface="Arial" panose="020B0604020202020204" pitchFamily="34" charset="0"/>
+                <a:cs typeface="Arial" panose="020B0604020202020204" pitchFamily="34" charset="0"/>
+              </a:rPr>
+              <a:t>Landscape/watershed scale: LULC, soils, topography, </a:t>
+            </a:r>
+          </a:p>
+          <a:p>
+            <a:endParaRPr lang="en-US" sz="1600" dirty="0">
+              <a:latin typeface="Arial" panose="020B0604020202020204" pitchFamily="34" charset="0"/>
+              <a:cs typeface="Arial" panose="020B0604020202020204" pitchFamily="34" charset="0"/>
+            </a:endParaRPr>
+          </a:p>
+          <a:p>
+            <a:r>
+              <a:rPr lang="en-US" sz="1600" dirty="0">
+                <a:latin typeface="Arial" panose="020B0604020202020204" pitchFamily="34" charset="0"/>
+                <a:cs typeface="Arial" panose="020B0604020202020204" pitchFamily="34" charset="0"/>
+              </a:rPr>
+              <a:t>Regional/macroscale: climate, hydrology</a:t>
+            </a:r>
+          </a:p>
+        </p:txBody>
+      </p:sp>
+      <p:cxnSp>
+        <p:nvCxnSpPr>
+          <p:cNvPr id="115" name="Straight Arrow Connector 114">
+            <a:extLst>
+              <a:ext uri="{FF2B5EF4-FFF2-40B4-BE49-F238E27FC236}">
+                <a16:creationId xmlns:a16="http://schemas.microsoft.com/office/drawing/2014/main" id="{CC1AE29A-C644-E818-688D-976D6E014320}"/>
+              </a:ext>
+            </a:extLst>
+          </p:cNvPr>
+          <p:cNvCxnSpPr>
+            <a:cxnSpLocks/>
+          </p:cNvCxnSpPr>
+          <p:nvPr/>
+        </p:nvCxnSpPr>
+        <p:spPr>
+          <a:xfrm>
+            <a:off x="8531432" y="2562466"/>
+            <a:ext cx="2716843" cy="8855"/>
+          </a:xfrm>
+          <a:prstGeom prst="straightConnector1">
+            <a:avLst/>
+          </a:prstGeom>
+          <a:ln w="28575">
+            <a:solidFill>
+              <a:schemeClr val="tx1"/>
+            </a:solidFill>
+            <a:tailEnd type="triangle"/>
+          </a:ln>
+        </p:spPr>
+        <p:style>
+          <a:lnRef idx="1">
+            <a:schemeClr val="accent1"/>
+          </a:lnRef>
+          <a:fillRef idx="0">
+            <a:schemeClr val="accent1"/>
+          </a:fillRef>
+          <a:effectRef idx="0">
+            <a:schemeClr val="accent1"/>
+          </a:effectRef>
+          <a:fontRef idx="minor">
+            <a:schemeClr val="tx1"/>
+          </a:fontRef>
+        </p:style>
+      </p:cxnSp>
+      <p:sp>
+        <p:nvSpPr>
+          <p:cNvPr id="118" name="TextBox 117">
+            <a:extLst>
+              <a:ext uri="{FF2B5EF4-FFF2-40B4-BE49-F238E27FC236}">
+                <a16:creationId xmlns:a16="http://schemas.microsoft.com/office/drawing/2014/main" id="{FBF0753B-1B6D-B6E9-1632-3331CBC942AC}"/>
+              </a:ext>
+            </a:extLst>
+          </p:cNvPr>
+          <p:cNvSpPr txBox="1"/>
+          <p:nvPr/>
+        </p:nvSpPr>
+        <p:spPr>
+          <a:xfrm>
+            <a:off x="8175993" y="2556077"/>
+            <a:ext cx="1657524" cy="276999"/>
+          </a:xfrm>
+          <a:prstGeom prst="rect">
+            <a:avLst/>
+          </a:prstGeom>
+          <a:noFill/>
+        </p:spPr>
+        <p:txBody>
+          <a:bodyPr wrap="square" rtlCol="0">
+            <a:spAutoFit/>
+          </a:bodyPr>
+          <a:lstStyle/>
+          <a:p>
+            <a:r>
+              <a:rPr lang="en-US" sz="1200" dirty="0">
+                <a:latin typeface="Arial" panose="020B0604020202020204" pitchFamily="34" charset="0"/>
+                <a:cs typeface="Arial" panose="020B0604020202020204" pitchFamily="34" charset="0"/>
+              </a:rPr>
+              <a:t>Deep</a:t>
+            </a:r>
+          </a:p>
+        </p:txBody>
+      </p:sp>
+      <p:sp>
+        <p:nvSpPr>
+          <p:cNvPr id="119" name="TextBox 118">
+            <a:extLst>
+              <a:ext uri="{FF2B5EF4-FFF2-40B4-BE49-F238E27FC236}">
+                <a16:creationId xmlns:a16="http://schemas.microsoft.com/office/drawing/2014/main" id="{F071370E-8311-3BB1-D15B-8C248CF54905}"/>
+              </a:ext>
+            </a:extLst>
+          </p:cNvPr>
+          <p:cNvSpPr txBox="1"/>
+          <p:nvPr/>
+        </p:nvSpPr>
+        <p:spPr>
+          <a:xfrm>
+            <a:off x="10900122" y="2601993"/>
+            <a:ext cx="805695" cy="276999"/>
+          </a:xfrm>
+          <a:prstGeom prst="rect">
+            <a:avLst/>
+          </a:prstGeom>
+          <a:noFill/>
+        </p:spPr>
+        <p:txBody>
+          <a:bodyPr wrap="square" rtlCol="0">
+            <a:spAutoFit/>
+          </a:bodyPr>
+          <a:lstStyle/>
+          <a:p>
+            <a:r>
+              <a:rPr lang="en-US" sz="1200" dirty="0">
+                <a:latin typeface="Arial" panose="020B0604020202020204" pitchFamily="34" charset="0"/>
+                <a:cs typeface="Arial" panose="020B0604020202020204" pitchFamily="34" charset="0"/>
+              </a:rPr>
+              <a:t>Shallow</a:t>
+            </a:r>
+          </a:p>
+        </p:txBody>
+      </p:sp>
+      <p:cxnSp>
+        <p:nvCxnSpPr>
+          <p:cNvPr id="120" name="Straight Arrow Connector 119">
+            <a:extLst>
+              <a:ext uri="{FF2B5EF4-FFF2-40B4-BE49-F238E27FC236}">
+                <a16:creationId xmlns:a16="http://schemas.microsoft.com/office/drawing/2014/main" id="{59F1CA5D-C9D9-AC94-1FB2-F155CF86AE98}"/>
+              </a:ext>
+            </a:extLst>
+          </p:cNvPr>
+          <p:cNvCxnSpPr>
+            <a:cxnSpLocks/>
+          </p:cNvCxnSpPr>
+          <p:nvPr/>
+        </p:nvCxnSpPr>
+        <p:spPr>
+          <a:xfrm>
+            <a:off x="8507861" y="3158459"/>
+            <a:ext cx="2716843" cy="8855"/>
+          </a:xfrm>
+          <a:prstGeom prst="straightConnector1">
+            <a:avLst/>
+          </a:prstGeom>
+          <a:ln w="28575">
+            <a:solidFill>
+              <a:schemeClr val="tx1"/>
+            </a:solidFill>
+            <a:tailEnd type="triangle"/>
+          </a:ln>
+        </p:spPr>
+        <p:style>
+          <a:lnRef idx="1">
+            <a:schemeClr val="accent1"/>
+          </a:lnRef>
+          <a:fillRef idx="0">
+            <a:schemeClr val="accent1"/>
+          </a:fillRef>
+          <a:effectRef idx="0">
+            <a:schemeClr val="accent1"/>
+          </a:effectRef>
+          <a:fontRef idx="minor">
+            <a:schemeClr val="tx1"/>
+          </a:fontRef>
+        </p:style>
+      </p:cxnSp>
+      <p:sp>
+        <p:nvSpPr>
+          <p:cNvPr id="121" name="TextBox 120">
+            <a:extLst>
+              <a:ext uri="{FF2B5EF4-FFF2-40B4-BE49-F238E27FC236}">
+                <a16:creationId xmlns:a16="http://schemas.microsoft.com/office/drawing/2014/main" id="{707F4F4E-00D3-D9F7-8767-847B102DAC69}"/>
+              </a:ext>
+            </a:extLst>
+          </p:cNvPr>
+          <p:cNvSpPr txBox="1"/>
+          <p:nvPr/>
+        </p:nvSpPr>
+        <p:spPr>
+          <a:xfrm>
+            <a:off x="8152422" y="3152070"/>
+            <a:ext cx="1657524" cy="276999"/>
+          </a:xfrm>
+          <a:prstGeom prst="rect">
+            <a:avLst/>
+          </a:prstGeom>
+          <a:noFill/>
+        </p:spPr>
+        <p:txBody>
+          <a:bodyPr wrap="square" rtlCol="0">
+            <a:spAutoFit/>
+          </a:bodyPr>
+          <a:lstStyle/>
+          <a:p>
+            <a:r>
+              <a:rPr lang="en-US" sz="1200" dirty="0">
+                <a:latin typeface="Arial" panose="020B0604020202020204" pitchFamily="34" charset="0"/>
+                <a:cs typeface="Arial" panose="020B0604020202020204" pitchFamily="34" charset="0"/>
+              </a:rPr>
+              <a:t>Low</a:t>
+            </a:r>
+          </a:p>
+        </p:txBody>
+      </p:sp>
+      <p:sp>
+        <p:nvSpPr>
+          <p:cNvPr id="122" name="TextBox 121">
+            <a:extLst>
+              <a:ext uri="{FF2B5EF4-FFF2-40B4-BE49-F238E27FC236}">
+                <a16:creationId xmlns:a16="http://schemas.microsoft.com/office/drawing/2014/main" id="{161ADF72-FEAF-C656-0095-19EE19A6AA74}"/>
+              </a:ext>
+            </a:extLst>
+          </p:cNvPr>
+          <p:cNvSpPr txBox="1"/>
+          <p:nvPr/>
+        </p:nvSpPr>
+        <p:spPr>
+          <a:xfrm>
+            <a:off x="10905127" y="3197986"/>
+            <a:ext cx="805695" cy="276999"/>
+          </a:xfrm>
+          <a:prstGeom prst="rect">
+            <a:avLst/>
+          </a:prstGeom>
+          <a:noFill/>
+        </p:spPr>
+        <p:txBody>
+          <a:bodyPr wrap="square" rtlCol="0">
+            <a:spAutoFit/>
+          </a:bodyPr>
+          <a:lstStyle/>
+          <a:p>
+            <a:r>
+              <a:rPr lang="en-US" sz="1200" dirty="0">
+                <a:latin typeface="Arial" panose="020B0604020202020204" pitchFamily="34" charset="0"/>
+                <a:cs typeface="Arial" panose="020B0604020202020204" pitchFamily="34" charset="0"/>
+              </a:rPr>
+              <a:t>High</a:t>
+            </a:r>
+          </a:p>
+        </p:txBody>
+      </p:sp>
+      <p:sp>
+        <p:nvSpPr>
+          <p:cNvPr id="123" name="TextBox 122">
+            <a:extLst>
+              <a:ext uri="{FF2B5EF4-FFF2-40B4-BE49-F238E27FC236}">
+                <a16:creationId xmlns:a16="http://schemas.microsoft.com/office/drawing/2014/main" id="{25723C1A-F954-5D29-DDD8-B9BE56B84B9E}"/>
+              </a:ext>
+            </a:extLst>
+          </p:cNvPr>
+          <p:cNvSpPr txBox="1"/>
+          <p:nvPr/>
+        </p:nvSpPr>
+        <p:spPr>
+          <a:xfrm>
+            <a:off x="8276546" y="3403664"/>
+            <a:ext cx="3261700" cy="307777"/>
+          </a:xfrm>
+          <a:prstGeom prst="rect">
+            <a:avLst/>
+          </a:prstGeom>
+          <a:noFill/>
+        </p:spPr>
+        <p:txBody>
+          <a:bodyPr wrap="square" rtlCol="0">
+            <a:spAutoFit/>
+          </a:bodyPr>
+          <a:lstStyle/>
+          <a:p>
+            <a:pPr algn="ctr"/>
+            <a:r>
+              <a:rPr lang="en-US" sz="1400" dirty="0">
+                <a:latin typeface="Arial" panose="020B0604020202020204" pitchFamily="34" charset="0"/>
+                <a:cs typeface="Arial" panose="020B0604020202020204" pitchFamily="34" charset="0"/>
+              </a:rPr>
+              <a:t>Water clarity</a:t>
+            </a:r>
+          </a:p>
+        </p:txBody>
+      </p:sp>
+      <p:cxnSp>
+        <p:nvCxnSpPr>
+          <p:cNvPr id="124" name="Straight Arrow Connector 123">
+            <a:extLst>
+              <a:ext uri="{FF2B5EF4-FFF2-40B4-BE49-F238E27FC236}">
+                <a16:creationId xmlns:a16="http://schemas.microsoft.com/office/drawing/2014/main" id="{DE1BCFE1-1250-32AE-EE74-F263D98E8010}"/>
+              </a:ext>
+            </a:extLst>
+          </p:cNvPr>
+          <p:cNvCxnSpPr>
+            <a:cxnSpLocks/>
+          </p:cNvCxnSpPr>
+          <p:nvPr/>
+        </p:nvCxnSpPr>
+        <p:spPr>
+          <a:xfrm>
+            <a:off x="8513616" y="3770872"/>
+            <a:ext cx="2716843" cy="8855"/>
+          </a:xfrm>
+          <a:prstGeom prst="straightConnector1">
+            <a:avLst/>
+          </a:prstGeom>
+          <a:ln w="28575">
+            <a:solidFill>
+              <a:schemeClr val="tx1"/>
+            </a:solidFill>
+            <a:tailEnd type="triangle"/>
+          </a:ln>
+        </p:spPr>
+        <p:style>
+          <a:lnRef idx="1">
+            <a:schemeClr val="accent1"/>
+          </a:lnRef>
+          <a:fillRef idx="0">
+            <a:schemeClr val="accent1"/>
+          </a:fillRef>
+          <a:effectRef idx="0">
+            <a:schemeClr val="accent1"/>
+          </a:effectRef>
+          <a:fontRef idx="minor">
+            <a:schemeClr val="tx1"/>
+          </a:fontRef>
+        </p:style>
+      </p:cxnSp>
+      <p:sp>
+        <p:nvSpPr>
+          <p:cNvPr id="125" name="TextBox 124">
+            <a:extLst>
+              <a:ext uri="{FF2B5EF4-FFF2-40B4-BE49-F238E27FC236}">
+                <a16:creationId xmlns:a16="http://schemas.microsoft.com/office/drawing/2014/main" id="{5D65541A-C11D-33D8-17F0-996F5337869B}"/>
+              </a:ext>
+            </a:extLst>
+          </p:cNvPr>
+          <p:cNvSpPr txBox="1"/>
+          <p:nvPr/>
+        </p:nvSpPr>
+        <p:spPr>
+          <a:xfrm>
+            <a:off x="8158177" y="3764483"/>
+            <a:ext cx="1657524" cy="276999"/>
+          </a:xfrm>
+          <a:prstGeom prst="rect">
+            <a:avLst/>
+          </a:prstGeom>
+          <a:noFill/>
+        </p:spPr>
+        <p:txBody>
+          <a:bodyPr wrap="square" rtlCol="0">
+            <a:spAutoFit/>
+          </a:bodyPr>
+          <a:lstStyle/>
+          <a:p>
+            <a:r>
+              <a:rPr lang="en-US" sz="1200" dirty="0">
+                <a:latin typeface="Arial" panose="020B0604020202020204" pitchFamily="34" charset="0"/>
+                <a:cs typeface="Arial" panose="020B0604020202020204" pitchFamily="34" charset="0"/>
+              </a:rPr>
+              <a:t>Green/brown</a:t>
+            </a:r>
+          </a:p>
+        </p:txBody>
+      </p:sp>
+      <p:sp>
+        <p:nvSpPr>
+          <p:cNvPr id="126" name="TextBox 125">
+            <a:extLst>
+              <a:ext uri="{FF2B5EF4-FFF2-40B4-BE49-F238E27FC236}">
+                <a16:creationId xmlns:a16="http://schemas.microsoft.com/office/drawing/2014/main" id="{78BFA798-6CE3-3E35-DA76-DD24FA1186C1}"/>
+              </a:ext>
+            </a:extLst>
+          </p:cNvPr>
+          <p:cNvSpPr txBox="1"/>
+          <p:nvPr/>
+        </p:nvSpPr>
+        <p:spPr>
+          <a:xfrm>
+            <a:off x="10928698" y="3810399"/>
+            <a:ext cx="787879" cy="276999"/>
+          </a:xfrm>
+          <a:prstGeom prst="rect">
+            <a:avLst/>
+          </a:prstGeom>
+          <a:noFill/>
+        </p:spPr>
+        <p:txBody>
+          <a:bodyPr wrap="square" rtlCol="0">
+            <a:spAutoFit/>
+          </a:bodyPr>
+          <a:lstStyle/>
+          <a:p>
+            <a:r>
+              <a:rPr lang="en-US" sz="1200" dirty="0">
+                <a:latin typeface="Arial" panose="020B0604020202020204" pitchFamily="34" charset="0"/>
+                <a:cs typeface="Arial" panose="020B0604020202020204" pitchFamily="34" charset="0"/>
+              </a:rPr>
+              <a:t>Clear</a:t>
+            </a:r>
+          </a:p>
+        </p:txBody>
+      </p:sp>
+      <p:sp>
+        <p:nvSpPr>
+          <p:cNvPr id="127" name="TextBox 126">
+            <a:extLst>
+              <a:ext uri="{FF2B5EF4-FFF2-40B4-BE49-F238E27FC236}">
+                <a16:creationId xmlns:a16="http://schemas.microsoft.com/office/drawing/2014/main" id="{FE67FB88-C085-3A7B-3BEB-DF619BD0B3AE}"/>
+              </a:ext>
+            </a:extLst>
+          </p:cNvPr>
+          <p:cNvSpPr txBox="1"/>
+          <p:nvPr/>
+        </p:nvSpPr>
+        <p:spPr>
+          <a:xfrm>
+            <a:off x="8278656" y="4006690"/>
+            <a:ext cx="3261700" cy="307777"/>
+          </a:xfrm>
+          <a:prstGeom prst="rect">
+            <a:avLst/>
+          </a:prstGeom>
+          <a:noFill/>
+        </p:spPr>
+        <p:txBody>
+          <a:bodyPr wrap="square" rtlCol="0">
+            <a:spAutoFit/>
+          </a:bodyPr>
+          <a:lstStyle/>
+          <a:p>
+            <a:pPr algn="ctr"/>
+            <a:r>
+              <a:rPr lang="en-US" sz="1400" dirty="0">
+                <a:latin typeface="Arial" panose="020B0604020202020204" pitchFamily="34" charset="0"/>
+                <a:cs typeface="Arial" panose="020B0604020202020204" pitchFamily="34" charset="0"/>
+              </a:rPr>
+              <a:t>Nutrient concentration</a:t>
+            </a:r>
+          </a:p>
+        </p:txBody>
+      </p:sp>
+      <p:cxnSp>
+        <p:nvCxnSpPr>
+          <p:cNvPr id="128" name="Straight Arrow Connector 127">
+            <a:extLst>
+              <a:ext uri="{FF2B5EF4-FFF2-40B4-BE49-F238E27FC236}">
+                <a16:creationId xmlns:a16="http://schemas.microsoft.com/office/drawing/2014/main" id="{0CF5B9BA-B32C-951C-A519-667829D21DDD}"/>
+              </a:ext>
+            </a:extLst>
+          </p:cNvPr>
+          <p:cNvCxnSpPr>
+            <a:cxnSpLocks/>
+          </p:cNvCxnSpPr>
+          <p:nvPr/>
+        </p:nvCxnSpPr>
+        <p:spPr>
+          <a:xfrm>
+            <a:off x="8515726" y="4373898"/>
+            <a:ext cx="2716843" cy="8855"/>
+          </a:xfrm>
+          <a:prstGeom prst="straightConnector1">
+            <a:avLst/>
+          </a:prstGeom>
+          <a:ln w="28575">
+            <a:solidFill>
+              <a:schemeClr val="tx1"/>
+            </a:solidFill>
+            <a:tailEnd type="triangle"/>
+          </a:ln>
+        </p:spPr>
+        <p:style>
+          <a:lnRef idx="1">
+            <a:schemeClr val="accent1"/>
+          </a:lnRef>
+          <a:fillRef idx="0">
+            <a:schemeClr val="accent1"/>
+          </a:fillRef>
+          <a:effectRef idx="0">
+            <a:schemeClr val="accent1"/>
+          </a:effectRef>
+          <a:fontRef idx="minor">
+            <a:schemeClr val="tx1"/>
+          </a:fontRef>
+        </p:style>
+      </p:cxnSp>
+      <p:sp>
+        <p:nvSpPr>
+          <p:cNvPr id="129" name="TextBox 128">
+            <a:extLst>
+              <a:ext uri="{FF2B5EF4-FFF2-40B4-BE49-F238E27FC236}">
+                <a16:creationId xmlns:a16="http://schemas.microsoft.com/office/drawing/2014/main" id="{FE81136B-C7DB-DFFB-D124-616DB99A4132}"/>
+              </a:ext>
+            </a:extLst>
+          </p:cNvPr>
+          <p:cNvSpPr txBox="1"/>
+          <p:nvPr/>
+        </p:nvSpPr>
+        <p:spPr>
+          <a:xfrm>
+            <a:off x="8160287" y="4367509"/>
+            <a:ext cx="1657524" cy="276999"/>
+          </a:xfrm>
+          <a:prstGeom prst="rect">
+            <a:avLst/>
+          </a:prstGeom>
+          <a:noFill/>
+        </p:spPr>
+        <p:txBody>
+          <a:bodyPr wrap="square" rtlCol="0">
+            <a:spAutoFit/>
+          </a:bodyPr>
+          <a:lstStyle/>
+          <a:p>
+            <a:r>
+              <a:rPr lang="en-US" sz="1200" dirty="0">
+                <a:latin typeface="Arial" panose="020B0604020202020204" pitchFamily="34" charset="0"/>
+                <a:cs typeface="Arial" panose="020B0604020202020204" pitchFamily="34" charset="0"/>
+              </a:rPr>
+              <a:t>High</a:t>
+            </a:r>
+          </a:p>
+        </p:txBody>
+      </p:sp>
+      <p:sp>
+        <p:nvSpPr>
+          <p:cNvPr id="130" name="TextBox 129">
+            <a:extLst>
+              <a:ext uri="{FF2B5EF4-FFF2-40B4-BE49-F238E27FC236}">
+                <a16:creationId xmlns:a16="http://schemas.microsoft.com/office/drawing/2014/main" id="{CCA50D89-A3C4-FAC4-F960-BBB5EDB18FC3}"/>
+              </a:ext>
+            </a:extLst>
+          </p:cNvPr>
+          <p:cNvSpPr txBox="1"/>
+          <p:nvPr/>
+        </p:nvSpPr>
+        <p:spPr>
+          <a:xfrm>
+            <a:off x="10912992" y="4413425"/>
+            <a:ext cx="805695" cy="276999"/>
+          </a:xfrm>
+          <a:prstGeom prst="rect">
+            <a:avLst/>
+          </a:prstGeom>
+          <a:noFill/>
+        </p:spPr>
+        <p:txBody>
+          <a:bodyPr wrap="square" rtlCol="0">
+            <a:spAutoFit/>
+          </a:bodyPr>
+          <a:lstStyle/>
+          <a:p>
+            <a:r>
+              <a:rPr lang="en-US" sz="1200" dirty="0">
+                <a:latin typeface="Arial" panose="020B0604020202020204" pitchFamily="34" charset="0"/>
+                <a:cs typeface="Arial" panose="020B0604020202020204" pitchFamily="34" charset="0"/>
+              </a:rPr>
+              <a:t>Low</a:t>
+            </a:r>
+          </a:p>
+        </p:txBody>
+      </p:sp>
+      <p:sp>
+        <p:nvSpPr>
+          <p:cNvPr id="131" name="TextBox 130">
+            <a:extLst>
+              <a:ext uri="{FF2B5EF4-FFF2-40B4-BE49-F238E27FC236}">
+                <a16:creationId xmlns:a16="http://schemas.microsoft.com/office/drawing/2014/main" id="{DAC1EF82-7DAD-2BBC-211B-6062B6C4E784}"/>
+              </a:ext>
+            </a:extLst>
+          </p:cNvPr>
+          <p:cNvSpPr txBox="1"/>
+          <p:nvPr/>
+        </p:nvSpPr>
+        <p:spPr>
+          <a:xfrm>
+            <a:off x="8263890" y="4696244"/>
+            <a:ext cx="3261700" cy="307777"/>
+          </a:xfrm>
+          <a:prstGeom prst="rect">
+            <a:avLst/>
+          </a:prstGeom>
+          <a:noFill/>
+        </p:spPr>
+        <p:txBody>
+          <a:bodyPr wrap="square" rtlCol="0">
+            <a:spAutoFit/>
+          </a:bodyPr>
+          <a:lstStyle/>
+          <a:p>
+            <a:pPr algn="ctr"/>
+            <a:r>
+              <a:rPr lang="en-US" sz="1400" dirty="0">
+                <a:latin typeface="Arial" panose="020B0604020202020204" pitchFamily="34" charset="0"/>
+                <a:cs typeface="Arial" panose="020B0604020202020204" pitchFamily="34" charset="0"/>
+              </a:rPr>
+              <a:t>Hydrologic connectivity</a:t>
+            </a:r>
+          </a:p>
+        </p:txBody>
+      </p:sp>
+      <p:cxnSp>
+        <p:nvCxnSpPr>
+          <p:cNvPr id="132" name="Straight Arrow Connector 131">
+            <a:extLst>
+              <a:ext uri="{FF2B5EF4-FFF2-40B4-BE49-F238E27FC236}">
+                <a16:creationId xmlns:a16="http://schemas.microsoft.com/office/drawing/2014/main" id="{5C777607-C578-58FA-5960-B7462A5E9D6E}"/>
+              </a:ext>
+            </a:extLst>
+          </p:cNvPr>
+          <p:cNvCxnSpPr>
+            <a:cxnSpLocks/>
+          </p:cNvCxnSpPr>
+          <p:nvPr/>
+        </p:nvCxnSpPr>
+        <p:spPr>
+          <a:xfrm>
+            <a:off x="8500960" y="5063452"/>
+            <a:ext cx="2716843" cy="8855"/>
+          </a:xfrm>
+          <a:prstGeom prst="straightConnector1">
+            <a:avLst/>
+          </a:prstGeom>
+          <a:ln w="28575">
+            <a:solidFill>
+              <a:schemeClr val="tx1"/>
+            </a:solidFill>
+            <a:tailEnd type="triangle"/>
+          </a:ln>
+        </p:spPr>
+        <p:style>
+          <a:lnRef idx="1">
+            <a:schemeClr val="accent1"/>
+          </a:lnRef>
+          <a:fillRef idx="0">
+            <a:schemeClr val="accent1"/>
+          </a:fillRef>
+          <a:effectRef idx="0">
+            <a:schemeClr val="accent1"/>
+          </a:effectRef>
+          <a:fontRef idx="minor">
+            <a:schemeClr val="tx1"/>
+          </a:fontRef>
+        </p:style>
+      </p:cxnSp>
+      <p:sp>
+        <p:nvSpPr>
+          <p:cNvPr id="133" name="TextBox 132">
+            <a:extLst>
+              <a:ext uri="{FF2B5EF4-FFF2-40B4-BE49-F238E27FC236}">
+                <a16:creationId xmlns:a16="http://schemas.microsoft.com/office/drawing/2014/main" id="{E1282C34-B420-8A12-01DF-9945DD6F89CD}"/>
+              </a:ext>
+            </a:extLst>
+          </p:cNvPr>
+          <p:cNvSpPr txBox="1"/>
+          <p:nvPr/>
+        </p:nvSpPr>
+        <p:spPr>
+          <a:xfrm>
+            <a:off x="8145521" y="5057063"/>
+            <a:ext cx="1657524" cy="276999"/>
+          </a:xfrm>
+          <a:prstGeom prst="rect">
+            <a:avLst/>
+          </a:prstGeom>
+          <a:noFill/>
+        </p:spPr>
+        <p:txBody>
+          <a:bodyPr wrap="square" rtlCol="0">
+            <a:spAutoFit/>
+          </a:bodyPr>
+          <a:lstStyle/>
+          <a:p>
+            <a:r>
+              <a:rPr lang="en-US" sz="1200" dirty="0">
+                <a:latin typeface="Arial" panose="020B0604020202020204" pitchFamily="34" charset="0"/>
+                <a:cs typeface="Arial" panose="020B0604020202020204" pitchFamily="34" charset="0"/>
+              </a:rPr>
+              <a:t>Low</a:t>
+            </a:r>
+          </a:p>
+        </p:txBody>
+      </p:sp>
+      <p:sp>
+        <p:nvSpPr>
+          <p:cNvPr id="134" name="TextBox 133">
+            <a:extLst>
+              <a:ext uri="{FF2B5EF4-FFF2-40B4-BE49-F238E27FC236}">
+                <a16:creationId xmlns:a16="http://schemas.microsoft.com/office/drawing/2014/main" id="{33CF06AF-9CA9-9D30-E26F-FDCCF669A00F}"/>
+              </a:ext>
+            </a:extLst>
+          </p:cNvPr>
+          <p:cNvSpPr txBox="1"/>
+          <p:nvPr/>
+        </p:nvSpPr>
+        <p:spPr>
+          <a:xfrm>
+            <a:off x="10898226" y="5102979"/>
+            <a:ext cx="805695" cy="276999"/>
+          </a:xfrm>
+          <a:prstGeom prst="rect">
+            <a:avLst/>
+          </a:prstGeom>
+          <a:noFill/>
+        </p:spPr>
+        <p:txBody>
+          <a:bodyPr wrap="square" rtlCol="0">
+            <a:spAutoFit/>
+          </a:bodyPr>
+          <a:lstStyle/>
+          <a:p>
+            <a:r>
+              <a:rPr lang="en-US" sz="1200" dirty="0">
+                <a:latin typeface="Arial" panose="020B0604020202020204" pitchFamily="34" charset="0"/>
+                <a:cs typeface="Arial" panose="020B0604020202020204" pitchFamily="34" charset="0"/>
+              </a:rPr>
+              <a:t>High</a:t>
+            </a:r>
+          </a:p>
+        </p:txBody>
+      </p:sp>
+      <p:sp>
+        <p:nvSpPr>
+          <p:cNvPr id="136" name="TextBox 135">
+            <a:extLst>
+              <a:ext uri="{FF2B5EF4-FFF2-40B4-BE49-F238E27FC236}">
+                <a16:creationId xmlns:a16="http://schemas.microsoft.com/office/drawing/2014/main" id="{FC30DB59-C7E3-F30D-423C-1A58EBDD91C3}"/>
+              </a:ext>
+            </a:extLst>
+          </p:cNvPr>
+          <p:cNvSpPr txBox="1"/>
+          <p:nvPr/>
+        </p:nvSpPr>
+        <p:spPr>
+          <a:xfrm>
+            <a:off x="433244" y="959408"/>
+            <a:ext cx="3151684" cy="830997"/>
+          </a:xfrm>
+          <a:prstGeom prst="rect">
+            <a:avLst/>
+          </a:prstGeom>
+          <a:noFill/>
+        </p:spPr>
+        <p:txBody>
+          <a:bodyPr wrap="square" rtlCol="0">
+            <a:spAutoFit/>
+          </a:bodyPr>
+          <a:lstStyle/>
+          <a:p>
+            <a:r>
+              <a:rPr lang="en-US" sz="1600" b="1" dirty="0">
+                <a:latin typeface="Arial" panose="020B0604020202020204" pitchFamily="34" charset="0"/>
+                <a:cs typeface="Arial" panose="020B0604020202020204" pitchFamily="34" charset="0"/>
+              </a:rPr>
+              <a:t>A) Critical thresholds above which fire influence overrides background driver influence  </a:t>
+            </a:r>
+          </a:p>
+        </p:txBody>
+      </p:sp>
+      <p:sp>
+        <p:nvSpPr>
+          <p:cNvPr id="137" name="TextBox 136">
+            <a:extLst>
+              <a:ext uri="{FF2B5EF4-FFF2-40B4-BE49-F238E27FC236}">
+                <a16:creationId xmlns:a16="http://schemas.microsoft.com/office/drawing/2014/main" id="{6C3A0393-164C-85BB-9FD9-F30862DD1F78}"/>
+              </a:ext>
+            </a:extLst>
+          </p:cNvPr>
+          <p:cNvSpPr txBox="1"/>
+          <p:nvPr/>
+        </p:nvSpPr>
+        <p:spPr>
+          <a:xfrm>
+            <a:off x="4136605" y="965593"/>
+            <a:ext cx="3571604" cy="830997"/>
+          </a:xfrm>
+          <a:prstGeom prst="rect">
+            <a:avLst/>
+          </a:prstGeom>
+          <a:noFill/>
+        </p:spPr>
+        <p:txBody>
+          <a:bodyPr wrap="square" rtlCol="0">
+            <a:spAutoFit/>
+          </a:bodyPr>
+          <a:lstStyle/>
+          <a:p>
+            <a:r>
+              <a:rPr lang="en-US" sz="1600" b="1" dirty="0">
+                <a:latin typeface="Arial" panose="020B0604020202020204" pitchFamily="34" charset="0"/>
+                <a:cs typeface="Arial" panose="020B0604020202020204" pitchFamily="34" charset="0"/>
+              </a:rPr>
+              <a:t>B) Critical thresholds of watershed disturbance are lower for more fire-sensitive ecosystems</a:t>
+            </a:r>
+          </a:p>
+        </p:txBody>
+      </p:sp>
+      <p:sp>
+        <p:nvSpPr>
+          <p:cNvPr id="138" name="TextBox 137">
+            <a:extLst>
+              <a:ext uri="{FF2B5EF4-FFF2-40B4-BE49-F238E27FC236}">
+                <a16:creationId xmlns:a16="http://schemas.microsoft.com/office/drawing/2014/main" id="{62B1F89B-8285-9A08-B545-BBB9363BA3CB}"/>
+              </a:ext>
+            </a:extLst>
+          </p:cNvPr>
+          <p:cNvSpPr txBox="1"/>
+          <p:nvPr/>
+        </p:nvSpPr>
+        <p:spPr>
+          <a:xfrm>
+            <a:off x="8112388" y="954482"/>
+            <a:ext cx="3571604" cy="830997"/>
+          </a:xfrm>
+          <a:prstGeom prst="rect">
+            <a:avLst/>
+          </a:prstGeom>
+          <a:noFill/>
+        </p:spPr>
+        <p:txBody>
+          <a:bodyPr wrap="square" rtlCol="0">
+            <a:spAutoFit/>
+          </a:bodyPr>
+          <a:lstStyle/>
+          <a:p>
+            <a:r>
+              <a:rPr lang="en-US" sz="1600" b="1" dirty="0">
+                <a:latin typeface="Arial" panose="020B0604020202020204" pitchFamily="34" charset="0"/>
+                <a:cs typeface="Arial" panose="020B0604020202020204" pitchFamily="34" charset="0"/>
+              </a:rPr>
+              <a:t>C) Background drivers that influence fire sensitivity of lake ecosystems</a:t>
+            </a:r>
+          </a:p>
+        </p:txBody>
+      </p:sp>
+    </p:spTree>
+    <p:extLst>
+      <p:ext uri="{BB962C8B-B14F-4D97-AF65-F5344CB8AC3E}">
+        <p14:creationId xmlns:p14="http://schemas.microsoft.com/office/powerpoint/2010/main" val="1452427692"/>
       </p:ext>
     </p:extLst>
   </p:cSld>

</xml_diff>